<commit_message>
add uml for my project
</commit_message>
<xml_diff>
--- a/StudyProgress/MyProject/ProjectArchitecture/my_project_architecture.pptx
+++ b/StudyProgress/MyProject/ProjectArchitecture/my_project_architecture.pptx
@@ -196,7 +196,8 @@
           <a:p>
             <a:fld id="{5EE492C8-9E73-4B7E-81B8-B7E4BAB8C869}" type="datetimeFigureOut">
               <a:rPr lang="zh-CN" altLang="en-US" smtClean="0"/>
-              <a:t>2018/11/12 Monday</a:t>
+              <a:pPr/>
+              <a:t>2019/1/10</a:t>
             </a:fld>
             <a:endParaRPr lang="zh-CN" altLang="en-US"/>
           </a:p>
@@ -355,6 +356,7 @@
           <a:p>
             <a:fld id="{43587132-5354-4F68-996E-D6A8522E160B}" type="slidenum">
               <a:rPr lang="zh-CN" altLang="en-US" smtClean="0"/>
+              <a:pPr/>
               <a:t>‹#›</a:t>
             </a:fld>
             <a:endParaRPr lang="zh-CN" altLang="en-US"/>
@@ -364,7 +366,7 @@
     </p:spTree>
     <p:extLst>
       <p:ext uri="{BB962C8B-B14F-4D97-AF65-F5344CB8AC3E}">
-        <p14:creationId xmlns:p14="http://schemas.microsoft.com/office/powerpoint/2010/main" val="1803258115"/>
+        <p14:creationId xmlns:p14="http://schemas.microsoft.com/office/powerpoint/2010/main" xmlns="" val="1803258115"/>
       </p:ext>
     </p:extLst>
   </p:cSld>
@@ -533,6 +535,7 @@
           <a:p>
             <a:fld id="{43587132-5354-4F68-996E-D6A8522E160B}" type="slidenum">
               <a:rPr lang="zh-CN" altLang="en-US" smtClean="0"/>
+              <a:pPr/>
               <a:t>2</a:t>
             </a:fld>
             <a:endParaRPr lang="zh-CN" altLang="en-US"/>
@@ -542,7 +545,7 @@
     </p:spTree>
     <p:extLst>
       <p:ext uri="{BB962C8B-B14F-4D97-AF65-F5344CB8AC3E}">
-        <p14:creationId xmlns:p14="http://schemas.microsoft.com/office/powerpoint/2010/main" val="4231234983"/>
+        <p14:creationId xmlns:p14="http://schemas.microsoft.com/office/powerpoint/2010/main" xmlns="" val="4231234983"/>
       </p:ext>
     </p:extLst>
   </p:cSld>
@@ -621,6 +624,7 @@
           <a:p>
             <a:fld id="{43587132-5354-4F68-996E-D6A8522E160B}" type="slidenum">
               <a:rPr lang="zh-CN" altLang="en-US" smtClean="0"/>
+              <a:pPr/>
               <a:t>5</a:t>
             </a:fld>
             <a:endParaRPr lang="zh-CN" altLang="en-US"/>
@@ -630,7 +634,7 @@
     </p:spTree>
     <p:extLst>
       <p:ext uri="{BB962C8B-B14F-4D97-AF65-F5344CB8AC3E}">
-        <p14:creationId xmlns:p14="http://schemas.microsoft.com/office/powerpoint/2010/main" val="4231234983"/>
+        <p14:creationId xmlns:p14="http://schemas.microsoft.com/office/powerpoint/2010/main" xmlns="" val="4231234983"/>
       </p:ext>
     </p:extLst>
   </p:cSld>
@@ -821,7 +825,8 @@
           <a:p>
             <a:fld id="{530820CF-B880-4189-942D-D702A7CBA730}" type="datetimeFigureOut">
               <a:rPr lang="zh-CN" altLang="en-US" smtClean="0"/>
-              <a:t>2018/11/12 Monday</a:t>
+              <a:pPr/>
+              <a:t>2019/1/10</a:t>
             </a:fld>
             <a:endParaRPr lang="zh-CN" altLang="en-US"/>
           </a:p>
@@ -863,6 +868,7 @@
           <a:p>
             <a:fld id="{0C913308-F349-4B6D-A68A-DD1791B4A57B}" type="slidenum">
               <a:rPr lang="zh-CN" altLang="en-US" smtClean="0"/>
+              <a:pPr/>
               <a:t>‹#›</a:t>
             </a:fld>
             <a:endParaRPr lang="zh-CN" altLang="en-US"/>
@@ -986,7 +992,8 @@
           <a:p>
             <a:fld id="{530820CF-B880-4189-942D-D702A7CBA730}" type="datetimeFigureOut">
               <a:rPr lang="zh-CN" altLang="en-US" smtClean="0"/>
-              <a:t>2018/11/12 Monday</a:t>
+              <a:pPr/>
+              <a:t>2019/1/10</a:t>
             </a:fld>
             <a:endParaRPr lang="zh-CN" altLang="en-US"/>
           </a:p>
@@ -1028,6 +1035,7 @@
           <a:p>
             <a:fld id="{0C913308-F349-4B6D-A68A-DD1791B4A57B}" type="slidenum">
               <a:rPr lang="zh-CN" altLang="en-US" smtClean="0"/>
+              <a:pPr/>
               <a:t>‹#›</a:t>
             </a:fld>
             <a:endParaRPr lang="zh-CN" altLang="en-US"/>
@@ -1161,7 +1169,8 @@
           <a:p>
             <a:fld id="{530820CF-B880-4189-942D-D702A7CBA730}" type="datetimeFigureOut">
               <a:rPr lang="zh-CN" altLang="en-US" smtClean="0"/>
-              <a:t>2018/11/12 Monday</a:t>
+              <a:pPr/>
+              <a:t>2019/1/10</a:t>
             </a:fld>
             <a:endParaRPr lang="zh-CN" altLang="en-US"/>
           </a:p>
@@ -1203,6 +1212,7 @@
           <a:p>
             <a:fld id="{0C913308-F349-4B6D-A68A-DD1791B4A57B}" type="slidenum">
               <a:rPr lang="zh-CN" altLang="en-US" smtClean="0"/>
+              <a:pPr/>
               <a:t>‹#›</a:t>
             </a:fld>
             <a:endParaRPr lang="zh-CN" altLang="en-US"/>
@@ -1326,7 +1336,8 @@
           <a:p>
             <a:fld id="{530820CF-B880-4189-942D-D702A7CBA730}" type="datetimeFigureOut">
               <a:rPr lang="zh-CN" altLang="en-US" smtClean="0"/>
-              <a:t>2018/11/12 Monday</a:t>
+              <a:pPr/>
+              <a:t>2019/1/10</a:t>
             </a:fld>
             <a:endParaRPr lang="zh-CN" altLang="en-US"/>
           </a:p>
@@ -1368,6 +1379,7 @@
           <a:p>
             <a:fld id="{0C913308-F349-4B6D-A68A-DD1791B4A57B}" type="slidenum">
               <a:rPr lang="zh-CN" altLang="en-US" smtClean="0"/>
+              <a:pPr/>
               <a:t>‹#›</a:t>
             </a:fld>
             <a:endParaRPr lang="zh-CN" altLang="en-US"/>
@@ -1567,7 +1579,8 @@
           <a:p>
             <a:fld id="{530820CF-B880-4189-942D-D702A7CBA730}" type="datetimeFigureOut">
               <a:rPr lang="zh-CN" altLang="en-US" smtClean="0"/>
-              <a:t>2018/11/12 Monday</a:t>
+              <a:pPr/>
+              <a:t>2019/1/10</a:t>
             </a:fld>
             <a:endParaRPr lang="zh-CN" altLang="en-US"/>
           </a:p>
@@ -1609,6 +1622,7 @@
           <a:p>
             <a:fld id="{0C913308-F349-4B6D-A68A-DD1791B4A57B}" type="slidenum">
               <a:rPr lang="zh-CN" altLang="en-US" smtClean="0"/>
+              <a:pPr/>
               <a:t>‹#›</a:t>
             </a:fld>
             <a:endParaRPr lang="zh-CN" altLang="en-US"/>
@@ -1850,7 +1864,8 @@
           <a:p>
             <a:fld id="{530820CF-B880-4189-942D-D702A7CBA730}" type="datetimeFigureOut">
               <a:rPr lang="zh-CN" altLang="en-US" smtClean="0"/>
-              <a:t>2018/11/12 Monday</a:t>
+              <a:pPr/>
+              <a:t>2019/1/10</a:t>
             </a:fld>
             <a:endParaRPr lang="zh-CN" altLang="en-US"/>
           </a:p>
@@ -1892,6 +1907,7 @@
           <a:p>
             <a:fld id="{0C913308-F349-4B6D-A68A-DD1791B4A57B}" type="slidenum">
               <a:rPr lang="zh-CN" altLang="en-US" smtClean="0"/>
+              <a:pPr/>
               <a:t>‹#›</a:t>
             </a:fld>
             <a:endParaRPr lang="zh-CN" altLang="en-US"/>
@@ -2267,7 +2283,8 @@
           <a:p>
             <a:fld id="{530820CF-B880-4189-942D-D702A7CBA730}" type="datetimeFigureOut">
               <a:rPr lang="zh-CN" altLang="en-US" smtClean="0"/>
-              <a:t>2018/11/12 Monday</a:t>
+              <a:pPr/>
+              <a:t>2019/1/10</a:t>
             </a:fld>
             <a:endParaRPr lang="zh-CN" altLang="en-US"/>
           </a:p>
@@ -2309,6 +2326,7 @@
           <a:p>
             <a:fld id="{0C913308-F349-4B6D-A68A-DD1791B4A57B}" type="slidenum">
               <a:rPr lang="zh-CN" altLang="en-US" smtClean="0"/>
+              <a:pPr/>
               <a:t>‹#›</a:t>
             </a:fld>
             <a:endParaRPr lang="zh-CN" altLang="en-US"/>
@@ -2380,7 +2398,8 @@
           <a:p>
             <a:fld id="{530820CF-B880-4189-942D-D702A7CBA730}" type="datetimeFigureOut">
               <a:rPr lang="zh-CN" altLang="en-US" smtClean="0"/>
-              <a:t>2018/11/12 Monday</a:t>
+              <a:pPr/>
+              <a:t>2019/1/10</a:t>
             </a:fld>
             <a:endParaRPr lang="zh-CN" altLang="en-US"/>
           </a:p>
@@ -2422,6 +2441,7 @@
           <a:p>
             <a:fld id="{0C913308-F349-4B6D-A68A-DD1791B4A57B}" type="slidenum">
               <a:rPr lang="zh-CN" altLang="en-US" smtClean="0"/>
+              <a:pPr/>
               <a:t>‹#›</a:t>
             </a:fld>
             <a:endParaRPr lang="zh-CN" altLang="en-US"/>
@@ -2470,7 +2490,8 @@
           <a:p>
             <a:fld id="{530820CF-B880-4189-942D-D702A7CBA730}" type="datetimeFigureOut">
               <a:rPr lang="zh-CN" altLang="en-US" smtClean="0"/>
-              <a:t>2018/11/12 Monday</a:t>
+              <a:pPr/>
+              <a:t>2019/1/10</a:t>
             </a:fld>
             <a:endParaRPr lang="zh-CN" altLang="en-US"/>
           </a:p>
@@ -2512,6 +2533,7 @@
           <a:p>
             <a:fld id="{0C913308-F349-4B6D-A68A-DD1791B4A57B}" type="slidenum">
               <a:rPr lang="zh-CN" altLang="en-US" smtClean="0"/>
+              <a:pPr/>
               <a:t>‹#›</a:t>
             </a:fld>
             <a:endParaRPr lang="zh-CN" altLang="en-US"/>
@@ -2742,7 +2764,8 @@
           <a:p>
             <a:fld id="{530820CF-B880-4189-942D-D702A7CBA730}" type="datetimeFigureOut">
               <a:rPr lang="zh-CN" altLang="en-US" smtClean="0"/>
-              <a:t>2018/11/12 Monday</a:t>
+              <a:pPr/>
+              <a:t>2019/1/10</a:t>
             </a:fld>
             <a:endParaRPr lang="zh-CN" altLang="en-US"/>
           </a:p>
@@ -2784,6 +2807,7 @@
           <a:p>
             <a:fld id="{0C913308-F349-4B6D-A68A-DD1791B4A57B}" type="slidenum">
               <a:rPr lang="zh-CN" altLang="en-US" smtClean="0"/>
+              <a:pPr/>
               <a:t>‹#›</a:t>
             </a:fld>
             <a:endParaRPr lang="zh-CN" altLang="en-US"/>
@@ -2990,7 +3014,8 @@
           <a:p>
             <a:fld id="{530820CF-B880-4189-942D-D702A7CBA730}" type="datetimeFigureOut">
               <a:rPr lang="zh-CN" altLang="en-US" smtClean="0"/>
-              <a:t>2018/11/12 Monday</a:t>
+              <a:pPr/>
+              <a:t>2019/1/10</a:t>
             </a:fld>
             <a:endParaRPr lang="zh-CN" altLang="en-US"/>
           </a:p>
@@ -3032,6 +3057,7 @@
           <a:p>
             <a:fld id="{0C913308-F349-4B6D-A68A-DD1791B4A57B}" type="slidenum">
               <a:rPr lang="zh-CN" altLang="en-US" smtClean="0"/>
+              <a:pPr/>
               <a:t>‹#›</a:t>
             </a:fld>
             <a:endParaRPr lang="zh-CN" altLang="en-US"/>
@@ -3198,7 +3224,8 @@
           <a:p>
             <a:fld id="{530820CF-B880-4189-942D-D702A7CBA730}" type="datetimeFigureOut">
               <a:rPr lang="zh-CN" altLang="en-US" smtClean="0"/>
-              <a:t>2018/11/12 Monday</a:t>
+              <a:pPr/>
+              <a:t>2019/1/10</a:t>
             </a:fld>
             <a:endParaRPr lang="zh-CN" altLang="en-US"/>
           </a:p>
@@ -3276,6 +3303,7 @@
           <a:p>
             <a:fld id="{0C913308-F349-4B6D-A68A-DD1791B4A57B}" type="slidenum">
               <a:rPr lang="zh-CN" altLang="en-US" smtClean="0"/>
+              <a:pPr/>
               <a:t>‹#›</a:t>
             </a:fld>
             <a:endParaRPr lang="zh-CN" altLang="en-US"/>
@@ -3613,7 +3641,7 @@
     </p:spTree>
     <p:extLst>
       <p:ext uri="{BB962C8B-B14F-4D97-AF65-F5344CB8AC3E}">
-        <p14:creationId xmlns:p14="http://schemas.microsoft.com/office/powerpoint/2010/main" val="1013166751"/>
+        <p14:creationId xmlns:p14="http://schemas.microsoft.com/office/powerpoint/2010/main" xmlns="" val="1013166751"/>
       </p:ext>
     </p:extLst>
   </p:cSld>
@@ -3648,7 +3676,7 @@
         </p:nvSpPr>
         <p:spPr>
           <a:xfrm>
-            <a:off x="539552" y="4797152"/>
+            <a:off x="539552" y="5229200"/>
             <a:ext cx="2016224" cy="504056"/>
           </a:xfrm>
           <a:prstGeom prst="roundRect">
@@ -3692,7 +3720,7 @@
         </p:nvSpPr>
         <p:spPr>
           <a:xfrm>
-            <a:off x="539552" y="4293096"/>
+            <a:off x="539552" y="4797152"/>
             <a:ext cx="2016224" cy="504056"/>
           </a:xfrm>
           <a:prstGeom prst="roundRect">
@@ -3777,7 +3805,11 @@
             <a:pPr algn="ctr"/>
             <a:r>
               <a:rPr lang="en-US" altLang="zh-CN" dirty="0" err="1" smtClean="0"/>
-              <a:t>ApplicationLayer</a:t>
+              <a:t>Control</a:t>
+            </a:r>
+            <a:r>
+              <a:rPr lang="en-US" altLang="zh-CN" dirty="0" err="1" smtClean="0"/>
+              <a:t>Layer</a:t>
             </a:r>
             <a:endParaRPr lang="en-US" altLang="zh-CN" dirty="0" smtClean="0"/>
           </a:p>
@@ -3821,7 +3853,7 @@
             <a:pPr algn="ctr"/>
             <a:r>
               <a:rPr lang="en-US" altLang="zh-CN" dirty="0" err="1" smtClean="0"/>
-              <a:t>InteractionLayer</a:t>
+              <a:t>ViewLayer</a:t>
             </a:r>
             <a:endParaRPr lang="en-US" altLang="zh-CN" dirty="0" smtClean="0"/>
           </a:p>
@@ -4080,7 +4112,7 @@
         </p:nvSpPr>
         <p:spPr>
           <a:xfrm>
-            <a:off x="881742" y="5661248"/>
+            <a:off x="3635896" y="5661248"/>
             <a:ext cx="2088232" cy="369332"/>
           </a:xfrm>
           <a:prstGeom prst="rect">
@@ -4111,10 +4143,54 @@
           </a:p>
         </p:txBody>
       </p:sp>
+      <p:sp>
+        <p:nvSpPr>
+          <p:cNvPr id="13" name="圆角矩形 12"/>
+          <p:cNvSpPr/>
+          <p:nvPr/>
+        </p:nvSpPr>
+        <p:spPr>
+          <a:xfrm>
+            <a:off x="539552" y="4293096"/>
+            <a:ext cx="2016224" cy="504056"/>
+          </a:xfrm>
+          <a:prstGeom prst="roundRect">
+            <a:avLst/>
+          </a:prstGeom>
+        </p:spPr>
+        <p:style>
+          <a:lnRef idx="2">
+            <a:schemeClr val="accent1">
+              <a:shade val="50000"/>
+            </a:schemeClr>
+          </a:lnRef>
+          <a:fillRef idx="1">
+            <a:schemeClr val="accent1"/>
+          </a:fillRef>
+          <a:effectRef idx="0">
+            <a:schemeClr val="accent1"/>
+          </a:effectRef>
+          <a:fontRef idx="minor">
+            <a:schemeClr val="lt1"/>
+          </a:fontRef>
+        </p:style>
+        <p:txBody>
+          <a:bodyPr rtlCol="0" anchor="ctr"/>
+          <a:lstStyle/>
+          <a:p>
+            <a:pPr algn="ctr"/>
+            <a:r>
+              <a:rPr lang="en-US" altLang="zh-CN" dirty="0" err="1" smtClean="0"/>
+              <a:t>ModelLayer</a:t>
+            </a:r>
+            <a:endParaRPr lang="en-US" altLang="zh-CN" dirty="0" smtClean="0"/>
+          </a:p>
+        </p:txBody>
+      </p:sp>
     </p:spTree>
     <p:extLst>
       <p:ext uri="{BB962C8B-B14F-4D97-AF65-F5344CB8AC3E}">
-        <p14:creationId xmlns:p14="http://schemas.microsoft.com/office/powerpoint/2010/main" val="469695826"/>
+        <p14:creationId xmlns:p14="http://schemas.microsoft.com/office/powerpoint/2010/main" xmlns="" val="469695826"/>
       </p:ext>
     </p:extLst>
   </p:cSld>
@@ -4839,7 +4915,7 @@
     </p:spTree>
     <p:extLst>
       <p:ext uri="{BB962C8B-B14F-4D97-AF65-F5344CB8AC3E}">
-        <p14:creationId xmlns:p14="http://schemas.microsoft.com/office/powerpoint/2010/main" val="748711177"/>
+        <p14:creationId xmlns:p14="http://schemas.microsoft.com/office/powerpoint/2010/main" xmlns="" val="748711177"/>
       </p:ext>
     </p:extLst>
   </p:cSld>
@@ -5698,7 +5774,7 @@
     </p:spTree>
     <p:extLst>
       <p:ext uri="{BB962C8B-B14F-4D97-AF65-F5344CB8AC3E}">
-        <p14:creationId xmlns:p14="http://schemas.microsoft.com/office/powerpoint/2010/main" val="1050729204"/>
+        <p14:creationId xmlns:p14="http://schemas.microsoft.com/office/powerpoint/2010/main" xmlns="" val="1050729204"/>
       </p:ext>
     </p:extLst>
   </p:cSld>
@@ -5809,7 +5885,6 @@
               <a:rPr lang="en-US" altLang="zh-CN" dirty="0" smtClean="0"/>
               <a:t>CCS Simulator</a:t>
             </a:r>
-            <a:endParaRPr lang="en-US" altLang="zh-CN" dirty="0" smtClean="0"/>
           </a:p>
         </p:txBody>
       </p:sp>
@@ -6065,7 +6140,6 @@
               <a:rPr lang="en-US" altLang="zh-CN" dirty="0" smtClean="0"/>
               <a:t>()</a:t>
             </a:r>
-            <a:endParaRPr lang="en-US" altLang="zh-CN" dirty="0" smtClean="0"/>
           </a:p>
         </p:txBody>
       </p:sp>
@@ -6109,14 +6183,13 @@
               <a:rPr lang="en-US" altLang="zh-CN" dirty="0" smtClean="0"/>
               <a:t>Controller</a:t>
             </a:r>
-            <a:endParaRPr lang="en-US" altLang="zh-CN" dirty="0" smtClean="0"/>
           </a:p>
         </p:txBody>
       </p:sp>
     </p:spTree>
     <p:extLst>
       <p:ext uri="{BB962C8B-B14F-4D97-AF65-F5344CB8AC3E}">
-        <p14:creationId xmlns:p14="http://schemas.microsoft.com/office/powerpoint/2010/main" val="2243660944"/>
+        <p14:creationId xmlns:p14="http://schemas.microsoft.com/office/powerpoint/2010/main" xmlns="" val="2243660944"/>
       </p:ext>
     </p:extLst>
   </p:cSld>

</xml_diff>